<commit_message>
Added all the files and versions Kevin wanted them in for progress report
</commit_message>
<xml_diff>
--- a/ProgressReportMidWinter/Progress-Report-MidWinter-team38.pptx
+++ b/ProgressReportMidWinter/Progress-Report-MidWinter-team38.pptx
@@ -237,7 +237,7 @@
           <a:p>
             <a:fld id="{5595E460-FE72-1944-9016-BC07E0124CDF}" type="datetimeFigureOut">
               <a:rPr lang="en-US" smtClean="0"/>
-              <a:t>2/23/2017</a:t>
+              <a:t>2/24/2017</a:t>
             </a:fld>
             <a:endParaRPr lang="en-US"/>
           </a:p>
@@ -301,38 +301,37 @@
           <a:p>
             <a:pPr lvl="0"/>
             <a:r>
-              <a:rPr lang="en-US" smtClean="0"/>
+              <a:rPr lang="en-US"/>
               <a:t>Click to edit Master text styles</a:t>
             </a:r>
           </a:p>
           <a:p>
             <a:pPr lvl="1"/>
             <a:r>
-              <a:rPr lang="en-US" smtClean="0"/>
+              <a:rPr lang="en-US"/>
               <a:t>Second level</a:t>
             </a:r>
           </a:p>
           <a:p>
             <a:pPr lvl="2"/>
             <a:r>
-              <a:rPr lang="en-US" smtClean="0"/>
+              <a:rPr lang="en-US"/>
               <a:t>Third level</a:t>
             </a:r>
           </a:p>
           <a:p>
             <a:pPr lvl="3"/>
             <a:r>
-              <a:rPr lang="en-US" smtClean="0"/>
+              <a:rPr lang="en-US"/>
               <a:t>Fourth level</a:t>
             </a:r>
           </a:p>
           <a:p>
             <a:pPr lvl="4"/>
             <a:r>
-              <a:rPr lang="en-US" smtClean="0"/>
+              <a:rPr lang="en-US"/>
               <a:t>Fifth level</a:t>
             </a:r>
-            <a:endParaRPr lang="en-US"/>
           </a:p>
         </p:txBody>
       </p:sp>
@@ -718,7 +717,7 @@
           <a:p>
             <a:fld id="{A4E0E745-8390-40CE-8931-8C2AFB7B5CA9}" type="datetimeFigureOut">
               <a:rPr lang="en-US" smtClean="0"/>
-              <a:t>2/23/2017</a:t>
+              <a:t>2/24/2017</a:t>
             </a:fld>
             <a:endParaRPr lang="en-US"/>
           </a:p>
@@ -886,7 +885,7 @@
           <a:p>
             <a:fld id="{A4E0E745-8390-40CE-8931-8C2AFB7B5CA9}" type="datetimeFigureOut">
               <a:rPr lang="en-US" smtClean="0"/>
-              <a:t>2/23/2017</a:t>
+              <a:t>2/24/2017</a:t>
             </a:fld>
             <a:endParaRPr lang="en-US"/>
           </a:p>
@@ -1064,7 +1063,7 @@
           <a:p>
             <a:fld id="{A4E0E745-8390-40CE-8931-8C2AFB7B5CA9}" type="datetimeFigureOut">
               <a:rPr lang="en-US" smtClean="0"/>
-              <a:t>2/23/2017</a:t>
+              <a:t>2/24/2017</a:t>
             </a:fld>
             <a:endParaRPr lang="en-US"/>
           </a:p>
@@ -1254,7 +1253,7 @@
           <a:p>
             <a:fld id="{A4E0E745-8390-40CE-8931-8C2AFB7B5CA9}" type="datetimeFigureOut">
               <a:rPr lang="en-US" smtClean="0"/>
-              <a:t>2/23/2017</a:t>
+              <a:t>2/24/2017</a:t>
             </a:fld>
             <a:endParaRPr lang="en-US"/>
           </a:p>
@@ -1444,7 +1443,7 @@
           <a:p>
             <a:fld id="{A4E0E745-8390-40CE-8931-8C2AFB7B5CA9}" type="datetimeFigureOut">
               <a:rPr lang="en-US" smtClean="0"/>
-              <a:t>2/23/2017</a:t>
+              <a:t>2/24/2017</a:t>
             </a:fld>
             <a:endParaRPr lang="en-US"/>
           </a:p>
@@ -1634,7 +1633,7 @@
           <a:p>
             <a:fld id="{A4E0E745-8390-40CE-8931-8C2AFB7B5CA9}" type="datetimeFigureOut">
               <a:rPr lang="en-US" smtClean="0"/>
-              <a:t>2/23/2017</a:t>
+              <a:t>2/24/2017</a:t>
             </a:fld>
             <a:endParaRPr lang="en-US"/>
           </a:p>
@@ -1824,7 +1823,7 @@
           <a:p>
             <a:fld id="{A4E0E745-8390-40CE-8931-8C2AFB7B5CA9}" type="datetimeFigureOut">
               <a:rPr lang="en-US" smtClean="0"/>
-              <a:t>2/23/2017</a:t>
+              <a:t>2/24/2017</a:t>
             </a:fld>
             <a:endParaRPr lang="en-US"/>
           </a:p>
@@ -1992,7 +1991,7 @@
           <a:p>
             <a:fld id="{A4E0E745-8390-40CE-8931-8C2AFB7B5CA9}" type="datetimeFigureOut">
               <a:rPr lang="en-US" smtClean="0"/>
-              <a:t>2/23/2017</a:t>
+              <a:t>2/24/2017</a:t>
             </a:fld>
             <a:endParaRPr lang="en-US"/>
           </a:p>
@@ -2160,7 +2159,7 @@
           <a:p>
             <a:fld id="{A4E0E745-8390-40CE-8931-8C2AFB7B5CA9}" type="datetimeFigureOut">
               <a:rPr lang="en-US" smtClean="0"/>
-              <a:t>2/23/2017</a:t>
+              <a:t>2/24/2017</a:t>
             </a:fld>
             <a:endParaRPr lang="en-US"/>
           </a:p>
@@ -2328,7 +2327,7 @@
           <a:p>
             <a:fld id="{A4E0E745-8390-40CE-8931-8C2AFB7B5CA9}" type="datetimeFigureOut">
               <a:rPr lang="en-US" smtClean="0"/>
-              <a:t>2/23/2017</a:t>
+              <a:t>2/24/2017</a:t>
             </a:fld>
             <a:endParaRPr lang="en-US"/>
           </a:p>
@@ -2496,7 +2495,7 @@
           <a:p>
             <a:fld id="{A4E0E745-8390-40CE-8931-8C2AFB7B5CA9}" type="datetimeFigureOut">
               <a:rPr lang="en-US" smtClean="0"/>
-              <a:t>2/23/2017</a:t>
+              <a:t>2/24/2017</a:t>
             </a:fld>
             <a:endParaRPr lang="en-US"/>
           </a:p>
@@ -2664,7 +2663,7 @@
           <a:p>
             <a:fld id="{A4E0E745-8390-40CE-8931-8C2AFB7B5CA9}" type="datetimeFigureOut">
               <a:rPr lang="en-US" smtClean="0"/>
-              <a:t>2/23/2017</a:t>
+              <a:t>2/24/2017</a:t>
             </a:fld>
             <a:endParaRPr lang="en-US"/>
           </a:p>
@@ -2832,7 +2831,7 @@
           <a:p>
             <a:fld id="{A4E0E745-8390-40CE-8931-8C2AFB7B5CA9}" type="datetimeFigureOut">
               <a:rPr lang="en-US" smtClean="0"/>
-              <a:t>2/23/2017</a:t>
+              <a:t>2/24/2017</a:t>
             </a:fld>
             <a:endParaRPr lang="en-US"/>
           </a:p>
@@ -3000,7 +2999,7 @@
           <a:p>
             <a:fld id="{A4E0E745-8390-40CE-8931-8C2AFB7B5CA9}" type="datetimeFigureOut">
               <a:rPr lang="en-US" smtClean="0"/>
-              <a:t>2/23/2017</a:t>
+              <a:t>2/24/2017</a:t>
             </a:fld>
             <a:endParaRPr lang="en-US"/>
           </a:p>
@@ -3168,7 +3167,7 @@
           <a:p>
             <a:fld id="{A4E0E745-8390-40CE-8931-8C2AFB7B5CA9}" type="datetimeFigureOut">
               <a:rPr lang="en-US" smtClean="0"/>
-              <a:t>2/23/2017</a:t>
+              <a:t>2/24/2017</a:t>
             </a:fld>
             <a:endParaRPr lang="en-US"/>
           </a:p>
@@ -3336,7 +3335,7 @@
           <a:p>
             <a:fld id="{A4E0E745-8390-40CE-8931-8C2AFB7B5CA9}" type="datetimeFigureOut">
               <a:rPr lang="en-US" smtClean="0"/>
-              <a:t>2/23/2017</a:t>
+              <a:t>2/24/2017</a:t>
             </a:fld>
             <a:endParaRPr lang="en-US"/>
           </a:p>
@@ -3504,7 +3503,7 @@
           <a:p>
             <a:fld id="{A4E0E745-8390-40CE-8931-8C2AFB7B5CA9}" type="datetimeFigureOut">
               <a:rPr lang="en-US" smtClean="0"/>
-              <a:t>2/23/2017</a:t>
+              <a:t>2/24/2017</a:t>
             </a:fld>
             <a:endParaRPr lang="en-US"/>
           </a:p>
@@ -3672,7 +3671,7 @@
           <a:p>
             <a:fld id="{A4E0E745-8390-40CE-8931-8C2AFB7B5CA9}" type="datetimeFigureOut">
               <a:rPr lang="en-US" smtClean="0"/>
-              <a:t>2/23/2017</a:t>
+              <a:t>2/24/2017</a:t>
             </a:fld>
             <a:endParaRPr lang="en-US"/>
           </a:p>
@@ -3840,7 +3839,7 @@
           <a:p>
             <a:fld id="{A4E0E745-8390-40CE-8931-8C2AFB7B5CA9}" type="datetimeFigureOut">
               <a:rPr lang="en-US" smtClean="0"/>
-              <a:t>2/23/2017</a:t>
+              <a:t>2/24/2017</a:t>
             </a:fld>
             <a:endParaRPr lang="en-US"/>
           </a:p>
@@ -4008,7 +4007,7 @@
           <a:p>
             <a:fld id="{A4E0E745-8390-40CE-8931-8C2AFB7B5CA9}" type="datetimeFigureOut">
               <a:rPr lang="en-US" smtClean="0"/>
-              <a:t>2/23/2017</a:t>
+              <a:t>2/24/2017</a:t>
             </a:fld>
             <a:endParaRPr lang="en-US"/>
           </a:p>
@@ -4176,7 +4175,7 @@
           <a:p>
             <a:fld id="{A4E0E745-8390-40CE-8931-8C2AFB7B5CA9}" type="datetimeFigureOut">
               <a:rPr lang="en-US" smtClean="0"/>
-              <a:t>2/23/2017</a:t>
+              <a:t>2/24/2017</a:t>
             </a:fld>
             <a:endParaRPr lang="en-US"/>
           </a:p>
@@ -4344,7 +4343,7 @@
           <a:p>
             <a:fld id="{A4E0E745-8390-40CE-8931-8C2AFB7B5CA9}" type="datetimeFigureOut">
               <a:rPr lang="en-US" smtClean="0"/>
-              <a:t>2/23/2017</a:t>
+              <a:t>2/24/2017</a:t>
             </a:fld>
             <a:endParaRPr lang="en-US"/>
           </a:p>
@@ -4589,7 +4588,7 @@
           <a:p>
             <a:fld id="{A4E0E745-8390-40CE-8931-8C2AFB7B5CA9}" type="datetimeFigureOut">
               <a:rPr lang="en-US" smtClean="0"/>
-              <a:t>2/23/2017</a:t>
+              <a:t>2/24/2017</a:t>
             </a:fld>
             <a:endParaRPr lang="en-US"/>
           </a:p>
@@ -4757,7 +4756,7 @@
           <a:p>
             <a:fld id="{A4E0E745-8390-40CE-8931-8C2AFB7B5CA9}" type="datetimeFigureOut">
               <a:rPr lang="en-US" smtClean="0"/>
-              <a:t>2/23/2017</a:t>
+              <a:t>2/24/2017</a:t>
             </a:fld>
             <a:endParaRPr lang="en-US"/>
           </a:p>
@@ -4925,7 +4924,7 @@
           <a:p>
             <a:fld id="{A4E0E745-8390-40CE-8931-8C2AFB7B5CA9}" type="datetimeFigureOut">
               <a:rPr lang="en-US" smtClean="0"/>
-              <a:t>2/23/2017</a:t>
+              <a:t>2/24/2017</a:t>
             </a:fld>
             <a:endParaRPr lang="en-US"/>
           </a:p>
@@ -5093,7 +5092,7 @@
           <a:p>
             <a:fld id="{A4E0E745-8390-40CE-8931-8C2AFB7B5CA9}" type="datetimeFigureOut">
               <a:rPr lang="en-US" smtClean="0"/>
-              <a:t>2/23/2017</a:t>
+              <a:t>2/24/2017</a:t>
             </a:fld>
             <a:endParaRPr lang="en-US"/>
           </a:p>
@@ -5261,7 +5260,7 @@
           <a:p>
             <a:fld id="{A4E0E745-8390-40CE-8931-8C2AFB7B5CA9}" type="datetimeFigureOut">
               <a:rPr lang="en-US" smtClean="0"/>
-              <a:t>2/23/2017</a:t>
+              <a:t>2/24/2017</a:t>
             </a:fld>
             <a:endParaRPr lang="en-US"/>
           </a:p>
@@ -5429,7 +5428,7 @@
           <a:p>
             <a:fld id="{A4E0E745-8390-40CE-8931-8C2AFB7B5CA9}" type="datetimeFigureOut">
               <a:rPr lang="en-US" smtClean="0"/>
-              <a:t>2/23/2017</a:t>
+              <a:t>2/24/2017</a:t>
             </a:fld>
             <a:endParaRPr lang="en-US"/>
           </a:p>
@@ -5597,7 +5596,7 @@
           <a:p>
             <a:fld id="{A4E0E745-8390-40CE-8931-8C2AFB7B5CA9}" type="datetimeFigureOut">
               <a:rPr lang="en-US" smtClean="0"/>
-              <a:t>2/23/2017</a:t>
+              <a:t>2/24/2017</a:t>
             </a:fld>
             <a:endParaRPr lang="en-US"/>
           </a:p>
@@ -5765,7 +5764,7 @@
           <a:p>
             <a:fld id="{A4E0E745-8390-40CE-8931-8C2AFB7B5CA9}" type="datetimeFigureOut">
               <a:rPr lang="en-US" smtClean="0"/>
-              <a:t>2/23/2017</a:t>
+              <a:t>2/24/2017</a:t>
             </a:fld>
             <a:endParaRPr lang="en-US"/>
           </a:p>
@@ -5933,7 +5932,7 @@
           <a:p>
             <a:fld id="{A4E0E745-8390-40CE-8931-8C2AFB7B5CA9}" type="datetimeFigureOut">
               <a:rPr lang="en-US" smtClean="0"/>
-              <a:t>2/23/2017</a:t>
+              <a:t>2/24/2017</a:t>
             </a:fld>
             <a:endParaRPr lang="en-US"/>
           </a:p>
@@ -6178,7 +6177,7 @@
           <a:p>
             <a:fld id="{A4E0E745-8390-40CE-8931-8C2AFB7B5CA9}" type="datetimeFigureOut">
               <a:rPr lang="en-US" smtClean="0"/>
-              <a:t>2/23/2017</a:t>
+              <a:t>2/24/2017</a:t>
             </a:fld>
             <a:endParaRPr lang="en-US"/>
           </a:p>
@@ -6407,7 +6406,7 @@
           <a:p>
             <a:fld id="{A4E0E745-8390-40CE-8931-8C2AFB7B5CA9}" type="datetimeFigureOut">
               <a:rPr lang="en-US" smtClean="0"/>
-              <a:t>2/23/2017</a:t>
+              <a:t>2/24/2017</a:t>
             </a:fld>
             <a:endParaRPr lang="en-US"/>
           </a:p>
@@ -6636,7 +6635,7 @@
           <a:p>
             <a:fld id="{A4E0E745-8390-40CE-8931-8C2AFB7B5CA9}" type="datetimeFigureOut">
               <a:rPr lang="en-US" smtClean="0"/>
-              <a:t>2/23/2017</a:t>
+              <a:t>2/24/2017</a:t>
             </a:fld>
             <a:endParaRPr lang="en-US"/>
           </a:p>
@@ -7000,7 +6999,7 @@
           <a:p>
             <a:fld id="{A4E0E745-8390-40CE-8931-8C2AFB7B5CA9}" type="datetimeFigureOut">
               <a:rPr lang="en-US" smtClean="0"/>
-              <a:t>2/23/2017</a:t>
+              <a:t>2/24/2017</a:t>
             </a:fld>
             <a:endParaRPr lang="en-US"/>
           </a:p>
@@ -7117,7 +7116,7 @@
           <a:p>
             <a:fld id="{A4E0E745-8390-40CE-8931-8C2AFB7B5CA9}" type="datetimeFigureOut">
               <a:rPr lang="en-US" smtClean="0"/>
-              <a:t>2/23/2017</a:t>
+              <a:t>2/24/2017</a:t>
             </a:fld>
             <a:endParaRPr lang="en-US"/>
           </a:p>
@@ -7212,7 +7211,7 @@
           <a:p>
             <a:fld id="{A4E0E745-8390-40CE-8931-8C2AFB7B5CA9}" type="datetimeFigureOut">
               <a:rPr lang="en-US" smtClean="0"/>
-              <a:t>2/23/2017</a:t>
+              <a:t>2/24/2017</a:t>
             </a:fld>
             <a:endParaRPr lang="en-US"/>
           </a:p>
@@ -7487,7 +7486,7 @@
           <a:p>
             <a:fld id="{A4E0E745-8390-40CE-8931-8C2AFB7B5CA9}" type="datetimeFigureOut">
               <a:rPr lang="en-US" smtClean="0"/>
-              <a:t>2/23/2017</a:t>
+              <a:t>2/24/2017</a:t>
             </a:fld>
             <a:endParaRPr lang="en-US"/>
           </a:p>
@@ -7739,7 +7738,7 @@
           <a:p>
             <a:fld id="{A4E0E745-8390-40CE-8931-8C2AFB7B5CA9}" type="datetimeFigureOut">
               <a:rPr lang="en-US" smtClean="0"/>
-              <a:t>2/23/2017</a:t>
+              <a:t>2/24/2017</a:t>
             </a:fld>
             <a:endParaRPr lang="en-US"/>
           </a:p>
@@ -7907,7 +7906,7 @@
           <a:p>
             <a:fld id="{A4E0E745-8390-40CE-8931-8C2AFB7B5CA9}" type="datetimeFigureOut">
               <a:rPr lang="en-US" smtClean="0"/>
-              <a:t>2/23/2017</a:t>
+              <a:t>2/24/2017</a:t>
             </a:fld>
             <a:endParaRPr lang="en-US"/>
           </a:p>
@@ -8085,7 +8084,7 @@
           <a:p>
             <a:fld id="{A4E0E745-8390-40CE-8931-8C2AFB7B5CA9}" type="datetimeFigureOut">
               <a:rPr lang="en-US" smtClean="0"/>
-              <a:t>2/23/2017</a:t>
+              <a:t>2/24/2017</a:t>
             </a:fld>
             <a:endParaRPr lang="en-US"/>
           </a:p>
@@ -8449,7 +8448,7 @@
           <a:p>
             <a:fld id="{A4E0E745-8390-40CE-8931-8C2AFB7B5CA9}" type="datetimeFigureOut">
               <a:rPr lang="en-US" smtClean="0"/>
-              <a:t>2/23/2017</a:t>
+              <a:t>2/24/2017</a:t>
             </a:fld>
             <a:endParaRPr lang="en-US"/>
           </a:p>
@@ -8566,7 +8565,7 @@
           <a:p>
             <a:fld id="{A4E0E745-8390-40CE-8931-8C2AFB7B5CA9}" type="datetimeFigureOut">
               <a:rPr lang="en-US" smtClean="0"/>
-              <a:t>2/23/2017</a:t>
+              <a:t>2/24/2017</a:t>
             </a:fld>
             <a:endParaRPr lang="en-US"/>
           </a:p>
@@ -8661,7 +8660,7 @@
           <a:p>
             <a:fld id="{A4E0E745-8390-40CE-8931-8C2AFB7B5CA9}" type="datetimeFigureOut">
               <a:rPr lang="en-US" smtClean="0"/>
-              <a:t>2/23/2017</a:t>
+              <a:t>2/24/2017</a:t>
             </a:fld>
             <a:endParaRPr lang="en-US"/>
           </a:p>
@@ -8936,7 +8935,7 @@
           <a:p>
             <a:fld id="{A4E0E745-8390-40CE-8931-8C2AFB7B5CA9}" type="datetimeFigureOut">
               <a:rPr lang="en-US" smtClean="0"/>
-              <a:t>2/23/2017</a:t>
+              <a:t>2/24/2017</a:t>
             </a:fld>
             <a:endParaRPr lang="en-US"/>
           </a:p>
@@ -9188,7 +9187,7 @@
           <a:p>
             <a:fld id="{A4E0E745-8390-40CE-8931-8C2AFB7B5CA9}" type="datetimeFigureOut">
               <a:rPr lang="en-US" smtClean="0"/>
-              <a:t>2/23/2017</a:t>
+              <a:t>2/24/2017</a:t>
             </a:fld>
             <a:endParaRPr lang="en-US"/>
           </a:p>
@@ -9399,7 +9398,7 @@
           <a:p>
             <a:fld id="{A4E0E745-8390-40CE-8931-8C2AFB7B5CA9}" type="datetimeFigureOut">
               <a:rPr lang="en-US" smtClean="0"/>
-              <a:t>2/23/2017</a:t>
+              <a:t>2/24/2017</a:t>
             </a:fld>
             <a:endParaRPr lang="en-US"/>
           </a:p>
@@ -9937,7 +9936,7 @@
           <a:p>
             <a:fld id="{A4E0E745-8390-40CE-8931-8C2AFB7B5CA9}" type="datetimeFigureOut">
               <a:rPr lang="en-US" smtClean="0"/>
-              <a:t>2/23/2017</a:t>
+              <a:t>2/24/2017</a:t>
             </a:fld>
             <a:endParaRPr lang="en-US"/>
           </a:p>
@@ -11959,13 +11958,6 @@
   <p:clrMapOvr>
     <a:masterClrMapping/>
   </p:clrMapOvr>
-  <p:timing>
-    <p:tnLst>
-      <p:par>
-        <p:cTn id="1" dur="indefinite" restart="never" nodeType="tmRoot"/>
-      </p:par>
-    </p:tnLst>
-  </p:timing>
 </p:sld>
 </file>
 
@@ -12002,10 +11994,9 @@
           <a:lstStyle/>
           <a:p>
             <a:r>
-              <a:rPr lang="en-US" smtClean="0"/>
+              <a:rPr lang="en-US"/>
               <a:t>Parser</a:t>
             </a:r>
-            <a:endParaRPr lang="en-US"/>
           </a:p>
         </p:txBody>
       </p:sp>
@@ -12045,11 +12036,7 @@
             <a:pPr lvl="1"/>
             <a:r>
               <a:rPr lang="en-US"/>
-              <a:t>Anything the user defines as such </a:t>
-            </a:r>
-            <a:r>
-              <a:rPr lang="en-US" smtClean="0"/>
-              <a:t>in </a:t>
+              <a:t>Anything the user defines as such in </a:t>
             </a:r>
             <a:r>
               <a:rPr lang="en-US" dirty="0"/>
@@ -12057,11 +12044,7 @@
             </a:r>
             <a:r>
               <a:rPr lang="en-US"/>
-              <a:t> grammars </a:t>
-            </a:r>
-            <a:r>
-              <a:rPr lang="en-US" smtClean="0"/>
-              <a:t>file</a:t>
+              <a:t> grammars file</a:t>
             </a:r>
             <a:endParaRPr lang="en-US" dirty="0"/>
           </a:p>
@@ -12112,11 +12095,7 @@
             <a:pPr lvl="1"/>
             <a:r>
               <a:rPr lang="en-US"/>
-              <a:t>Parent </a:t>
-            </a:r>
-            <a:r>
-              <a:rPr lang="en-US" smtClean="0"/>
-              <a:t>Token</a:t>
+              <a:t>Parent Token</a:t>
             </a:r>
             <a:endParaRPr lang="en-US" dirty="0"/>
           </a:p>
@@ -12138,13 +12117,6 @@
   <p:clrMapOvr>
     <a:masterClrMapping/>
   </p:clrMapOvr>
-  <p:timing>
-    <p:tnLst>
-      <p:par>
-        <p:cTn id="1" dur="indefinite" restart="never" nodeType="tmRoot"/>
-      </p:par>
-    </p:tnLst>
-  </p:timing>
 </p:sld>
 </file>
 
@@ -12181,10 +12153,9 @@
           <a:lstStyle/>
           <a:p>
             <a:r>
-              <a:rPr lang="en-US" dirty="0" smtClean="0"/>
+              <a:rPr lang="en-US" dirty="0"/>
               <a:t>Grammars</a:t>
             </a:r>
-            <a:endParaRPr lang="en-US" dirty="0"/>
           </a:p>
         </p:txBody>
       </p:sp>
@@ -12209,25 +12180,25 @@
           <a:lstStyle/>
           <a:p>
             <a:r>
-              <a:rPr lang="en-US" dirty="0" smtClean="0"/>
+              <a:rPr lang="en-US" dirty="0"/>
               <a:t>Used to Parse for specific tokens</a:t>
             </a:r>
           </a:p>
           <a:p>
             <a:r>
-              <a:rPr lang="en-US" dirty="0" smtClean="0"/>
+              <a:rPr lang="en-US" dirty="0"/>
               <a:t>Needs a type as the Hard coded parser behavior needs to be different</a:t>
             </a:r>
           </a:p>
           <a:p>
             <a:r>
-              <a:rPr lang="en-US" dirty="0" smtClean="0"/>
+              <a:rPr lang="en-US" dirty="0"/>
               <a:t>Current types: Links and tagged</a:t>
             </a:r>
           </a:p>
           <a:p>
             <a:r>
-              <a:rPr lang="en-US" dirty="0" smtClean="0"/>
+              <a:rPr lang="en-US" dirty="0"/>
               <a:t>Documentation will be made available to users</a:t>
             </a:r>
           </a:p>
@@ -12267,13 +12238,6 @@
   <p:clrMapOvr>
     <a:masterClrMapping/>
   </p:clrMapOvr>
-  <p:timing>
-    <p:tnLst>
-      <p:par>
-        <p:cTn id="1" dur="indefinite" restart="never" nodeType="tmRoot"/>
-      </p:par>
-    </p:tnLst>
-  </p:timing>
 </p:sld>
 </file>
 
@@ -12333,19 +12297,7 @@
           <a:p>
             <a:r>
               <a:rPr lang="en-US"/>
-              <a:t>The Parser </a:t>
-            </a:r>
-            <a:r>
-              <a:rPr lang="en-US" smtClean="0"/>
-              <a:t>will </a:t>
-            </a:r>
-            <a:r>
-              <a:rPr lang="en-US"/>
-              <a:t>now </a:t>
-            </a:r>
-            <a:r>
-              <a:rPr lang="en-US" smtClean="0"/>
-              <a:t>run only </a:t>
+              <a:t>The Parser will now run only </a:t>
             </a:r>
             <a:r>
               <a:rPr lang="en-US" dirty="0"/>
@@ -12353,13 +12305,8 @@
             </a:r>
             <a:r>
               <a:rPr lang="en-US"/>
-              <a:t> activation of </a:t>
-            </a:r>
-            <a:r>
-              <a:rPr lang="en-US" smtClean="0"/>
-              <a:t>the extension.</a:t>
-            </a:r>
-            <a:endParaRPr lang="en-US"/>
+              <a:t> activation of the extension.</a:t>
+            </a:r>
           </a:p>
           <a:p>
             <a:r>
@@ -12368,11 +12315,7 @@
             </a:r>
             <a:r>
               <a:rPr lang="en-US"/>
-              <a:t> Grammars can </a:t>
-            </a:r>
-            <a:r>
-              <a:rPr lang="en-US" smtClean="0"/>
-              <a:t>be </a:t>
+              <a:t> Grammars can be </a:t>
             </a:r>
             <a:r>
               <a:rPr lang="en-US" dirty="0"/>
@@ -12387,11 +12330,7 @@
           <a:p>
             <a:r>
               <a:rPr lang="en-US"/>
-              <a:t>Still </a:t>
-            </a:r>
-            <a:r>
-              <a:rPr lang="en-US" smtClean="0"/>
-              <a:t>in </a:t>
+              <a:t>Still in </a:t>
             </a:r>
             <a:r>
               <a:rPr lang="en-US" dirty="0"/>
@@ -12399,13 +12338,8 @@
             </a:r>
             <a:r>
               <a:rPr lang="en-US"/>
-              <a:t> of a few more behaviors (c-like </a:t>
-            </a:r>
-            <a:r>
-              <a:rPr lang="en-US" smtClean="0"/>
-              <a:t>functions)</a:t>
-            </a:r>
-            <a:endParaRPr lang="en-US"/>
+              <a:t> of a few more behaviors (c-like functions)</a:t>
+            </a:r>
           </a:p>
         </p:txBody>
       </p:sp>
@@ -12419,13 +12353,6 @@
   <p:clrMapOvr>
     <a:masterClrMapping/>
   </p:clrMapOvr>
-  <p:timing>
-    <p:tnLst>
-      <p:par>
-        <p:cTn id="1" dur="indefinite" restart="never" nodeType="tmRoot"/>
-      </p:par>
-    </p:tnLst>
-  </p:timing>
 </p:sld>
 </file>
 
@@ -12499,11 +12426,7 @@
             </a:r>
             <a:r>
               <a:rPr lang="en-US"/>
-              <a:t> in </a:t>
-            </a:r>
-            <a:r>
-              <a:rPr lang="en-US" smtClean="0"/>
-              <a:t>the </a:t>
+              <a:t> in the </a:t>
             </a:r>
             <a:r>
               <a:rPr lang="en-US" dirty="0"/>
@@ -12511,13 +12434,8 @@
             </a:r>
             <a:r>
               <a:rPr lang="en-US"/>
-              <a:t> structure </a:t>
-            </a:r>
-            <a:r>
-              <a:rPr lang="en-US" smtClean="0"/>
-              <a:t>JSON.</a:t>
-            </a:r>
-            <a:endParaRPr lang="en-US"/>
+              <a:t> structure JSON.</a:t>
+            </a:r>
           </a:p>
           <a:p>
             <a:r>
@@ -12565,13 +12483,6 @@
   <p:clrMapOvr>
     <a:masterClrMapping/>
   </p:clrMapOvr>
-  <p:timing>
-    <p:tnLst>
-      <p:par>
-        <p:cTn id="1" dur="indefinite" restart="never" nodeType="tmRoot"/>
-      </p:par>
-    </p:tnLst>
-  </p:timing>
 </p:sld>
 </file>
 
@@ -15725,13 +15636,6 @@
   <p:clrMapOvr>
     <a:masterClrMapping/>
   </p:clrMapOvr>
-  <p:timing>
-    <p:tnLst>
-      <p:par>
-        <p:cTn id="1" dur="indefinite" restart="never" nodeType="tmRoot"/>
-      </p:par>
-    </p:tnLst>
-  </p:timing>
 </p:sld>
 </file>
 
@@ -18715,13 +18619,6 @@
   <p:clrMapOvr>
     <a:masterClrMapping/>
   </p:clrMapOvr>
-  <p:timing>
-    <p:tnLst>
-      <p:par>
-        <p:cTn id="1" dur="indefinite" restart="never" nodeType="tmRoot"/>
-      </p:par>
-    </p:tnLst>
-  </p:timing>
 </p:sld>
 </file>
 
@@ -20892,13 +20789,6 @@
   <p:clrMapOvr>
     <a:masterClrMapping/>
   </p:clrMapOvr>
-  <p:timing>
-    <p:tnLst>
-      <p:par>
-        <p:cTn id="1" dur="indefinite" restart="never" nodeType="tmRoot"/>
-      </p:par>
-    </p:tnLst>
-  </p:timing>
 </p:sld>
 </file>
 
@@ -23568,13 +23458,6 @@
   <p:clrMapOvr>
     <a:masterClrMapping/>
   </p:clrMapOvr>
-  <p:timing>
-    <p:tnLst>
-      <p:par>
-        <p:cTn id="1" dur="indefinite" restart="never" nodeType="tmRoot"/>
-      </p:par>
-    </p:tnLst>
-  </p:timing>
 </p:sld>
 </file>
 
@@ -26664,13 +26547,6 @@
   <p:clrMapOvr>
     <a:masterClrMapping/>
   </p:clrMapOvr>
-  <p:timing>
-    <p:tnLst>
-      <p:par>
-        <p:cTn id="1" dur="indefinite" restart="never" nodeType="tmRoot"/>
-      </p:par>
-    </p:tnLst>
-  </p:timing>
 </p:sld>
 </file>
 
@@ -26707,10 +26583,9 @@
           <a:lstStyle/>
           <a:p>
             <a:r>
-              <a:rPr lang="en-US" dirty="0" smtClean="0"/>
+              <a:rPr lang="en-US" dirty="0"/>
               <a:t>Problems with this approach:</a:t>
             </a:r>
-            <a:endParaRPr lang="en-US" dirty="0"/>
           </a:p>
         </p:txBody>
       </p:sp>
@@ -26730,29 +26605,24 @@
           <a:lstStyle/>
           <a:p>
             <a:r>
-              <a:rPr lang="en-US" dirty="0" smtClean="0"/>
-              <a:t>Large Projects (about 100 files) are overwhelming and don’t provide useful </a:t>
-            </a:r>
-            <a:r>
-              <a:rPr lang="en-US" dirty="0" smtClean="0"/>
-              <a:t>information.</a:t>
-            </a:r>
-          </a:p>
-          <a:p>
-            <a:r>
-              <a:rPr lang="en-US" dirty="0" smtClean="0"/>
+              <a:rPr lang="en-US" dirty="0"/>
+              <a:t>Large Projects (about 100 files) are overwhelming and don’t provide useful information.</a:t>
+            </a:r>
+          </a:p>
+          <a:p>
+            <a:r>
+              <a:rPr lang="en-US" dirty="0"/>
               <a:t>No way to intuitively display directors.</a:t>
             </a:r>
-            <a:endParaRPr lang="en-US" dirty="0" smtClean="0"/>
-          </a:p>
-          <a:p>
-            <a:r>
-              <a:rPr lang="en-US" dirty="0" smtClean="0"/>
+          </a:p>
+          <a:p>
+            <a:r>
+              <a:rPr lang="en-US" dirty="0"/>
               <a:t>Too many links between files. Hard to distinguish what the links mean.</a:t>
             </a:r>
           </a:p>
           <a:p>
-            <a:endParaRPr lang="en-US" dirty="0" smtClean="0"/>
+            <a:endParaRPr lang="en-US" dirty="0"/>
           </a:p>
           <a:p>
             <a:endParaRPr lang="en-US" dirty="0"/>
@@ -26769,13 +26639,6 @@
   <p:clrMapOvr>
     <a:masterClrMapping/>
   </p:clrMapOvr>
-  <p:timing>
-    <p:tnLst>
-      <p:par>
-        <p:cTn id="1" dur="indefinite" restart="never" nodeType="tmRoot"/>
-      </p:par>
-    </p:tnLst>
-  </p:timing>
 </p:sld>
 </file>
 
@@ -26836,12 +26699,8 @@
           <a:lstStyle/>
           <a:p>
             <a:r>
-              <a:rPr lang="en-US" smtClean="0"/>
-              <a:t>Visualize </a:t>
-            </a:r>
-            <a:r>
-              <a:rPr lang="en-US"/>
-              <a:t>Code bases </a:t>
+              <a:rPr lang="en-US"/>
+              <a:t>Visualize Code bases </a:t>
             </a:r>
           </a:p>
           <a:p>
@@ -26854,11 +26713,7 @@
             </a:r>
             <a:r>
               <a:rPr lang="en-US"/>
-              <a:t> the past the </a:t>
-            </a:r>
-            <a:r>
-              <a:rPr lang="en-US" smtClean="0"/>
-              <a:t>Focus </a:t>
+              <a:t> the past the Focus </a:t>
             </a:r>
             <a:r>
               <a:rPr lang="en-US" dirty="0"/>
@@ -26888,10 +26743,9 @@
           </a:p>
           <a:p>
             <a:r>
-              <a:rPr lang="en-US" smtClean="0"/>
+              <a:rPr lang="en-US"/>
               <a:t>Errors</a:t>
             </a:r>
-            <a:endParaRPr lang="en-US"/>
           </a:p>
           <a:p>
             <a:endParaRPr lang="en-US"/>
@@ -26908,13 +26762,6 @@
   <p:clrMapOvr>
     <a:masterClrMapping/>
   </p:clrMapOvr>
-  <p:timing>
-    <p:tnLst>
-      <p:par>
-        <p:cTn id="1" dur="indefinite" restart="never" nodeType="tmRoot"/>
-      </p:par>
-    </p:tnLst>
-  </p:timing>
 </p:sld>
 </file>
 
@@ -26951,10 +26798,9 @@
           <a:lstStyle/>
           <a:p>
             <a:r>
-              <a:rPr lang="en-US" dirty="0" smtClean="0"/>
+              <a:rPr lang="en-US" dirty="0"/>
               <a:t>New Approach:</a:t>
             </a:r>
-            <a:endParaRPr lang="en-US" dirty="0"/>
           </a:p>
         </p:txBody>
       </p:sp>
@@ -26974,22 +26820,21 @@
           <a:lstStyle/>
           <a:p>
             <a:r>
-              <a:rPr lang="en-US" dirty="0" smtClean="0"/>
+              <a:rPr lang="en-US" dirty="0"/>
               <a:t>Render nodes in a hierarchy by file location.</a:t>
             </a:r>
           </a:p>
           <a:p>
             <a:r>
-              <a:rPr lang="en-US" dirty="0" smtClean="0"/>
+              <a:rPr lang="en-US" dirty="0"/>
               <a:t>Show Links between files only when a node is selected, highlight those links in a bright color</a:t>
             </a:r>
           </a:p>
           <a:p>
             <a:r>
-              <a:rPr lang="en-US" dirty="0" smtClean="0"/>
+              <a:rPr lang="en-US" dirty="0"/>
               <a:t>Expanding the nodes into subcomponents produces two new nodes below the parent, maintaining the hierarchy. </a:t>
             </a:r>
-            <a:endParaRPr lang="en-US" dirty="0"/>
           </a:p>
         </p:txBody>
       </p:sp>
@@ -27003,13 +26848,6 @@
   <p:clrMapOvr>
     <a:masterClrMapping/>
   </p:clrMapOvr>
-  <p:timing>
-    <p:tnLst>
-      <p:par>
-        <p:cTn id="1" dur="indefinite" restart="never" nodeType="tmRoot"/>
-      </p:par>
-    </p:tnLst>
-  </p:timing>
 </p:sld>
 </file>
 
@@ -27102,13 +26940,6 @@
   <p:clrMapOvr>
     <a:masterClrMapping/>
   </p:clrMapOvr>
-  <p:timing>
-    <p:tnLst>
-      <p:par>
-        <p:cTn id="1" dur="indefinite" restart="never" nodeType="tmRoot"/>
-      </p:par>
-    </p:tnLst>
-  </p:timing>
 </p:sld>
 </file>
 
@@ -27201,13 +27032,6 @@
   <p:clrMapOvr>
     <a:masterClrMapping/>
   </p:clrMapOvr>
-  <p:timing>
-    <p:tnLst>
-      <p:par>
-        <p:cTn id="1" dur="indefinite" restart="never" nodeType="tmRoot"/>
-      </p:par>
-    </p:tnLst>
-  </p:timing>
 </p:sld>
 </file>
 
@@ -27300,13 +27124,6 @@
   <p:clrMapOvr>
     <a:masterClrMapping/>
   </p:clrMapOvr>
-  <p:timing>
-    <p:tnLst>
-      <p:par>
-        <p:cTn id="1" dur="indefinite" restart="never" nodeType="tmRoot"/>
-      </p:par>
-    </p:tnLst>
-  </p:timing>
 </p:sld>
 </file>
 
@@ -27399,13 +27216,6 @@
   <p:clrMapOvr>
     <a:masterClrMapping/>
   </p:clrMapOvr>
-  <p:timing>
-    <p:tnLst>
-      <p:par>
-        <p:cTn id="1" dur="indefinite" restart="never" nodeType="tmRoot"/>
-      </p:par>
-    </p:tnLst>
-  </p:timing>
 </p:sld>
 </file>
 
@@ -27498,13 +27308,6 @@
   <p:clrMapOvr>
     <a:masterClrMapping/>
   </p:clrMapOvr>
-  <p:timing>
-    <p:tnLst>
-      <p:par>
-        <p:cTn id="1" dur="indefinite" restart="never" nodeType="tmRoot"/>
-      </p:par>
-    </p:tnLst>
-  </p:timing>
 </p:sld>
 </file>
 
@@ -27559,13 +27362,6 @@
   <p:clrMapOvr>
     <a:masterClrMapping/>
   </p:clrMapOvr>
-  <p:timing>
-    <p:tnLst>
-      <p:par>
-        <p:cTn id="1" dur="indefinite" restart="never" nodeType="tmRoot"/>
-      </p:par>
-    </p:tnLst>
-  </p:timing>
 </p:sld>
 </file>
 
@@ -27666,13 +27462,6 @@
   <p:clrMapOvr>
     <a:masterClrMapping/>
   </p:clrMapOvr>
-  <p:timing>
-    <p:tnLst>
-      <p:par>
-        <p:cTn id="1" dur="indefinite" restart="never" nodeType="tmRoot"/>
-      </p:par>
-    </p:tnLst>
-  </p:timing>
 </p:sld>
 </file>
 
@@ -27710,13 +27499,8 @@
           <a:p>
             <a:r>
               <a:rPr lang="en-US" dirty="0"/>
-              <a:t>GUI </a:t>
-            </a:r>
-            <a:r>
-              <a:rPr lang="en-US" dirty="0" smtClean="0"/>
-              <a:t>Implementation missing features</a:t>
-            </a:r>
-            <a:endParaRPr lang="en-US" dirty="0"/>
+              <a:t>GUI Implementation missing features</a:t>
+            </a:r>
           </a:p>
         </p:txBody>
       </p:sp>
@@ -27736,24 +27520,24 @@
           <a:lstStyle/>
           <a:p>
             <a:r>
-              <a:rPr lang="en-US" dirty="0" smtClean="0"/>
+              <a:rPr lang="en-US" dirty="0"/>
               <a:t>Single click links appearing</a:t>
             </a:r>
           </a:p>
           <a:p>
             <a:r>
-              <a:rPr lang="en-US" dirty="0" smtClean="0"/>
+              <a:rPr lang="en-US" dirty="0"/>
               <a:t>Error list</a:t>
             </a:r>
           </a:p>
           <a:p>
             <a:pPr lvl="1"/>
             <a:r>
-              <a:rPr lang="en-US" dirty="0" smtClean="0"/>
+              <a:rPr lang="en-US" dirty="0"/>
               <a:t>Process bridge to communicated between the UI, Parser and </a:t>
             </a:r>
             <a:r>
-              <a:rPr lang="en-US" dirty="0" err="1" smtClean="0"/>
+              <a:rPr lang="en-US" dirty="0" err="1"/>
               <a:t>VSCode</a:t>
             </a:r>
             <a:endParaRPr lang="en-US" dirty="0"/>
@@ -27770,13 +27554,6 @@
   <p:clrMapOvr>
     <a:masterClrMapping/>
   </p:clrMapOvr>
-  <p:timing>
-    <p:tnLst>
-      <p:par>
-        <p:cTn id="1" dur="indefinite" restart="never" nodeType="tmRoot"/>
-      </p:par>
-    </p:tnLst>
-  </p:timing>
 </p:sld>
 </file>
 
@@ -27863,13 +27640,6 @@
   <p:clrMapOvr>
     <a:masterClrMapping/>
   </p:clrMapOvr>
-  <p:timing>
-    <p:tnLst>
-      <p:par>
-        <p:cTn id="1" dur="indefinite" restart="never" nodeType="tmRoot"/>
-      </p:par>
-    </p:tnLst>
-  </p:timing>
 </p:sld>
 </file>
 
@@ -27994,13 +27764,6 @@
   <p:clrMapOvr>
     <a:masterClrMapping/>
   </p:clrMapOvr>
-  <p:timing>
-    <p:tnLst>
-      <p:par>
-        <p:cTn id="1" dur="indefinite" restart="never" nodeType="tmRoot"/>
-      </p:par>
-    </p:tnLst>
-  </p:timing>
 </p:sld>
 </file>
 
@@ -28071,12 +27834,8 @@
           </a:p>
           <a:p>
             <a:r>
-              <a:rPr lang="en-US" smtClean="0"/>
-              <a:t>Node </a:t>
-            </a:r>
-            <a:r>
-              <a:rPr lang="en-US"/>
-              <a:t>and error info stored in a file is used by the UI</a:t>
+              <a:rPr lang="en-US"/>
+              <a:t>Node and error info stored in a file is used by the UI</a:t>
             </a:r>
           </a:p>
           <a:p>
@@ -28094,13 +27853,6 @@
   <p:clrMapOvr>
     <a:masterClrMapping/>
   </p:clrMapOvr>
-  <p:timing>
-    <p:tnLst>
-      <p:par>
-        <p:cTn id="1" dur="indefinite" restart="never" nodeType="tmRoot"/>
-      </p:par>
-    </p:tnLst>
-  </p:timing>
 </p:sld>
 </file>
 
@@ -28166,10 +27918,9 @@
           <a:p>
             <a:pPr algn="ctr"/>
             <a:r>
-              <a:rPr lang="en-US" dirty="0" smtClean="0"/>
+              <a:rPr lang="en-US" dirty="0"/>
               <a:t>JSON</a:t>
             </a:r>
-            <a:endParaRPr lang="en-US" dirty="0"/>
           </a:p>
         </p:txBody>
       </p:sp>
@@ -28220,10 +27971,9 @@
           <a:p>
             <a:pPr algn="ctr"/>
             <a:r>
-              <a:rPr lang="en-US" dirty="0" smtClean="0"/>
+              <a:rPr lang="en-US" dirty="0"/>
               <a:t>Node Container</a:t>
             </a:r>
-            <a:endParaRPr lang="en-US" dirty="0"/>
           </a:p>
         </p:txBody>
       </p:sp>
@@ -28274,10 +28024,9 @@
           <a:p>
             <a:pPr algn="ctr"/>
             <a:r>
-              <a:rPr lang="en-US" dirty="0" smtClean="0"/>
+              <a:rPr lang="en-US" dirty="0"/>
               <a:t>Links</a:t>
             </a:r>
-            <a:endParaRPr lang="en-US" dirty="0"/>
           </a:p>
         </p:txBody>
       </p:sp>
@@ -28328,10 +28077,9 @@
           <a:p>
             <a:pPr algn="ctr"/>
             <a:r>
-              <a:rPr lang="en-US" dirty="0" smtClean="0"/>
+              <a:rPr lang="en-US" dirty="0"/>
               <a:t>Sub-Container Links</a:t>
             </a:r>
-            <a:endParaRPr lang="en-US" dirty="0"/>
           </a:p>
         </p:txBody>
       </p:sp>
@@ -28382,10 +28130,9 @@
           <a:p>
             <a:pPr algn="ctr"/>
             <a:r>
-              <a:rPr lang="en-US" dirty="0" smtClean="0"/>
+              <a:rPr lang="en-US" dirty="0"/>
               <a:t>Errors</a:t>
             </a:r>
-            <a:endParaRPr lang="en-US" dirty="0"/>
           </a:p>
         </p:txBody>
       </p:sp>
@@ -28431,10 +28178,9 @@
           <a:p>
             <a:pPr algn="ctr"/>
             <a:r>
-              <a:rPr lang="en-US" sz="1100" dirty="0" smtClean="0"/>
+              <a:rPr lang="en-US" sz="1100" dirty="0"/>
               <a:t>Destination Node ID</a:t>
             </a:r>
-            <a:endParaRPr lang="en-US" sz="1100" dirty="0"/>
           </a:p>
         </p:txBody>
       </p:sp>
@@ -28480,10 +28226,9 @@
           <a:p>
             <a:pPr algn="ctr"/>
             <a:r>
-              <a:rPr lang="en-US" sz="1100" dirty="0" smtClean="0"/>
+              <a:rPr lang="en-US" sz="1100" dirty="0"/>
               <a:t>ID</a:t>
             </a:r>
-            <a:endParaRPr lang="en-US" sz="1100" dirty="0"/>
           </a:p>
         </p:txBody>
       </p:sp>
@@ -28529,10 +28274,9 @@
           <a:p>
             <a:pPr algn="ctr"/>
             <a:r>
-              <a:rPr lang="en-US" sz="1100" dirty="0" smtClean="0"/>
+              <a:rPr lang="en-US" sz="1100" dirty="0"/>
               <a:t>Line Number</a:t>
             </a:r>
-            <a:endParaRPr lang="en-US" sz="1100" dirty="0"/>
           </a:p>
         </p:txBody>
       </p:sp>
@@ -28578,10 +28322,9 @@
           <a:p>
             <a:pPr algn="ctr"/>
             <a:r>
-              <a:rPr lang="en-US" sz="1100" dirty="0" smtClean="0"/>
+              <a:rPr lang="en-US" sz="1100" dirty="0"/>
               <a:t>Destination Node ID</a:t>
             </a:r>
-            <a:endParaRPr lang="en-US" sz="1100" dirty="0"/>
           </a:p>
         </p:txBody>
       </p:sp>
@@ -28627,10 +28370,9 @@
           <a:p>
             <a:pPr algn="ctr"/>
             <a:r>
-              <a:rPr lang="en-US" sz="1100" dirty="0" smtClean="0"/>
+              <a:rPr lang="en-US" sz="1100" dirty="0"/>
               <a:t>ID</a:t>
             </a:r>
-            <a:endParaRPr lang="en-US" sz="1100" dirty="0"/>
           </a:p>
         </p:txBody>
       </p:sp>
@@ -28676,10 +28418,9 @@
           <a:p>
             <a:pPr algn="ctr"/>
             <a:r>
-              <a:rPr lang="en-US" sz="1100" dirty="0" smtClean="0"/>
+              <a:rPr lang="en-US" sz="1100" dirty="0"/>
               <a:t>Line Number</a:t>
             </a:r>
-            <a:endParaRPr lang="en-US" sz="1100" dirty="0"/>
           </a:p>
         </p:txBody>
       </p:sp>
@@ -28725,10 +28466,9 @@
           <a:p>
             <a:pPr algn="ctr"/>
             <a:r>
-              <a:rPr lang="en-US" sz="1100" dirty="0" smtClean="0"/>
+              <a:rPr lang="en-US" sz="1100" dirty="0"/>
               <a:t>Error Message</a:t>
             </a:r>
-            <a:endParaRPr lang="en-US" sz="1100" dirty="0"/>
           </a:p>
         </p:txBody>
       </p:sp>
@@ -28774,10 +28514,9 @@
           <a:p>
             <a:pPr algn="ctr"/>
             <a:r>
-              <a:rPr lang="en-US" sz="1100" dirty="0" smtClean="0"/>
+              <a:rPr lang="en-US" sz="1100" dirty="0"/>
               <a:t>ID</a:t>
             </a:r>
-            <a:endParaRPr lang="en-US" sz="1100" dirty="0"/>
           </a:p>
         </p:txBody>
       </p:sp>
@@ -28823,10 +28562,9 @@
           <a:p>
             <a:pPr algn="ctr"/>
             <a:r>
-              <a:rPr lang="en-US" sz="1100" dirty="0" smtClean="0"/>
+              <a:rPr lang="en-US" sz="1100" dirty="0"/>
               <a:t>Line Number</a:t>
             </a:r>
-            <a:endParaRPr lang="en-US" sz="1100" dirty="0"/>
           </a:p>
         </p:txBody>
       </p:sp>
@@ -29241,10 +28979,9 @@
           <a:p>
             <a:pPr algn="ctr"/>
             <a:r>
-              <a:rPr lang="en-US" sz="1100" dirty="0" smtClean="0"/>
+              <a:rPr lang="en-US" sz="1100" dirty="0"/>
               <a:t>ID</a:t>
             </a:r>
-            <a:endParaRPr lang="en-US" sz="1100" dirty="0"/>
           </a:p>
         </p:txBody>
       </p:sp>
@@ -29290,10 +29027,9 @@
           <a:p>
             <a:pPr algn="ctr"/>
             <a:r>
-              <a:rPr lang="en-US" sz="1100" dirty="0" smtClean="0"/>
+              <a:rPr lang="en-US" sz="1100" dirty="0"/>
               <a:t>Level</a:t>
             </a:r>
-            <a:endParaRPr lang="en-US" sz="1100" dirty="0"/>
           </a:p>
         </p:txBody>
       </p:sp>
@@ -29339,22 +29075,17 @@
           <a:p>
             <a:pPr algn="ctr"/>
             <a:r>
-              <a:rPr lang="en-US" sz="1100" dirty="0" err="1" smtClean="0"/>
+              <a:rPr lang="en-US" sz="1100" dirty="0" err="1"/>
               <a:t>IsSub</a:t>
             </a:r>
-            <a:endParaRPr lang="en-US" sz="1100" dirty="0" smtClean="0"/>
+            <a:endParaRPr lang="en-US" sz="1100" dirty="0"/>
           </a:p>
           <a:p>
             <a:pPr algn="ctr"/>
             <a:r>
               <a:rPr lang="en-US" sz="1100" dirty="0"/>
-              <a:t>-</a:t>
-            </a:r>
-            <a:r>
-              <a:rPr lang="en-US" sz="1100" dirty="0" smtClean="0"/>
-              <a:t>Container</a:t>
-            </a:r>
-            <a:endParaRPr lang="en-US" sz="1100" dirty="0"/>
+              <a:t>-Container</a:t>
+            </a:r>
           </a:p>
         </p:txBody>
       </p:sp>
@@ -29400,10 +29131,9 @@
           <a:p>
             <a:pPr algn="ctr"/>
             <a:r>
-              <a:rPr lang="en-US" sz="1100" dirty="0" smtClean="0"/>
+              <a:rPr lang="en-US" sz="1100" dirty="0"/>
               <a:t>Name</a:t>
             </a:r>
-            <a:endParaRPr lang="en-US" sz="1100" dirty="0"/>
           </a:p>
         </p:txBody>
       </p:sp>
@@ -29449,10 +29179,9 @@
           <a:p>
             <a:pPr algn="ctr"/>
             <a:r>
-              <a:rPr lang="en-US" sz="1100" dirty="0" smtClean="0"/>
+              <a:rPr lang="en-US" sz="1100" dirty="0"/>
               <a:t>Type</a:t>
             </a:r>
-            <a:endParaRPr lang="en-US" sz="1100" dirty="0"/>
           </a:p>
         </p:txBody>
       </p:sp>
@@ -29498,10 +29227,9 @@
           <a:p>
             <a:pPr algn="ctr"/>
             <a:r>
-              <a:rPr lang="en-US" sz="1100" dirty="0" smtClean="0"/>
+              <a:rPr lang="en-US" sz="1100" dirty="0"/>
               <a:t>Path</a:t>
             </a:r>
-            <a:endParaRPr lang="en-US" sz="1100" dirty="0"/>
           </a:p>
         </p:txBody>
       </p:sp>
@@ -30007,18 +29735,13 @@
           <a:p>
             <a:pPr algn="ctr"/>
             <a:r>
-              <a:rPr lang="en-US" sz="1000" dirty="0" smtClean="0">
+              <a:rPr lang="en-US" sz="1000" dirty="0">
                 <a:solidFill>
                   <a:schemeClr val="tx1"/>
                 </a:solidFill>
               </a:rPr>
               <a:t>M</a:t>
             </a:r>
-            <a:endParaRPr lang="en-US" sz="1000" dirty="0">
-              <a:solidFill>
-                <a:schemeClr val="tx1"/>
-              </a:solidFill>
-            </a:endParaRPr>
           </a:p>
         </p:txBody>
       </p:sp>
@@ -30067,18 +29790,13 @@
           <a:p>
             <a:pPr algn="ctr"/>
             <a:r>
-              <a:rPr lang="en-US" sz="1000" dirty="0" smtClean="0">
+              <a:rPr lang="en-US" sz="1000" dirty="0">
                 <a:solidFill>
                   <a:schemeClr val="tx1"/>
                 </a:solidFill>
               </a:rPr>
               <a:t>M</a:t>
             </a:r>
-            <a:endParaRPr lang="en-US" sz="1000" dirty="0">
-              <a:solidFill>
-                <a:schemeClr val="tx1"/>
-              </a:solidFill>
-            </a:endParaRPr>
           </a:p>
         </p:txBody>
       </p:sp>
@@ -30127,18 +29845,13 @@
           <a:p>
             <a:pPr algn="ctr"/>
             <a:r>
-              <a:rPr lang="en-US" sz="1000" dirty="0" smtClean="0">
+              <a:rPr lang="en-US" sz="1000" dirty="0">
                 <a:solidFill>
                   <a:schemeClr val="tx1"/>
                 </a:solidFill>
               </a:rPr>
               <a:t>M</a:t>
             </a:r>
-            <a:endParaRPr lang="en-US" sz="1000" dirty="0">
-              <a:solidFill>
-                <a:schemeClr val="tx1"/>
-              </a:solidFill>
-            </a:endParaRPr>
           </a:p>
         </p:txBody>
       </p:sp>
@@ -30187,18 +29900,13 @@
           <a:p>
             <a:pPr algn="ctr"/>
             <a:r>
-              <a:rPr lang="en-US" sz="1000" dirty="0" smtClean="0">
+              <a:rPr lang="en-US" sz="1000" dirty="0">
                 <a:solidFill>
                   <a:schemeClr val="tx1"/>
                 </a:solidFill>
               </a:rPr>
               <a:t>M</a:t>
             </a:r>
-            <a:endParaRPr lang="en-US" sz="1000" dirty="0">
-              <a:solidFill>
-                <a:schemeClr val="tx1"/>
-              </a:solidFill>
-            </a:endParaRPr>
           </a:p>
         </p:txBody>
       </p:sp>
@@ -30223,10 +29931,9 @@
           <a:lstStyle/>
           <a:p>
             <a:r>
-              <a:rPr lang="en-US" dirty="0" smtClean="0"/>
+              <a:rPr lang="en-US" dirty="0"/>
               <a:t>Updated Schema</a:t>
             </a:r>
-            <a:endParaRPr lang="en-US" dirty="0"/>
           </a:p>
         </p:txBody>
       </p:sp>
@@ -30240,13 +29947,6 @@
   <p:clrMapOvr>
     <a:masterClrMapping/>
   </p:clrMapOvr>
-  <p:timing>
-    <p:tnLst>
-      <p:par>
-        <p:cTn id="1" dur="indefinite" restart="never" nodeType="tmRoot"/>
-      </p:par>
-    </p:tnLst>
-  </p:timing>
 </p:sld>
 </file>
 
@@ -30318,13 +30018,6 @@
   <p:clrMapOvr>
     <a:masterClrMapping/>
   </p:clrMapOvr>
-  <p:timing>
-    <p:tnLst>
-      <p:par>
-        <p:cTn id="1" dur="indefinite" restart="never" nodeType="tmRoot"/>
-      </p:par>
-    </p:tnLst>
-  </p:timing>
 </p:sld>
 </file>
 
@@ -30393,18 +30086,18 @@
           <a:lstStyle/>
           <a:p>
             <a:r>
-              <a:rPr lang="en-US"/>
-              <a:t>Winter Break- During the break some of the team was able to get together and set up some solid goals for the next term as well as work on getting their different parts together.  </a:t>
-            </a:r>
-          </a:p>
-          <a:p>
-            <a:r>
-              <a:rPr lang="en-US"/>
-              <a:t>Week 1- We had a positive meeting with Scaffidi after getting a very early working prototype.</a:t>
-            </a:r>
-          </a:p>
-          <a:p>
-            <a:endParaRPr lang="en-US"/>
+              <a:rPr lang="en-US" dirty="0"/>
+              <a:t>Winter Break- Team got together to discuss distribution of work, got started on individual parts</a:t>
+            </a:r>
+          </a:p>
+          <a:p>
+            <a:r>
+              <a:rPr lang="en-US" dirty="0"/>
+              <a:t>Week 1- Worked to develop very early prototype, client satisfied with progress, set end of February beta deadline</a:t>
+            </a:r>
+          </a:p>
+          <a:p>
+            <a:endParaRPr lang="en-US" dirty="0"/>
           </a:p>
         </p:txBody>
       </p:sp>
@@ -31048,13 +30741,6 @@
   <p:clrMapOvr>
     <a:masterClrMapping/>
   </p:clrMapOvr>
-  <p:timing>
-    <p:tnLst>
-      <p:par>
-        <p:cTn id="1" dur="indefinite" restart="never" nodeType="tmRoot"/>
-      </p:par>
-    </p:tnLst>
-  </p:timing>
 </p:sld>
 </file>
 
@@ -31118,20 +30804,20 @@
           <a:lstStyle/>
           <a:p>
             <a:r>
-              <a:rPr lang="en-US"/>
-              <a:t>Week 2- The pace slowed after a hectic week 1. We only on some minor changes to the parser and UI.</a:t>
-            </a:r>
-          </a:p>
-          <a:p>
-            <a:r>
-              <a:rPr lang="en-US"/>
-              <a:t>Week 3- We continued working on some small changes to the UI and some work on error handling.</a:t>
-            </a:r>
-          </a:p>
-          <a:p>
-            <a:r>
-              <a:rPr lang="en-US"/>
-              <a:t>Week 4- Started working on changing the documents, and OneNote. </a:t>
+              <a:rPr lang="en-US" dirty="0"/>
+              <a:t>Week 2- Continued to tweak early prototype before moving on to major features</a:t>
+            </a:r>
+          </a:p>
+          <a:p>
+            <a:r>
+              <a:rPr lang="en-US" dirty="0"/>
+              <a:t>Week 3- Worked on small UI changes</a:t>
+            </a:r>
+          </a:p>
+          <a:p>
+            <a:r>
+              <a:rPr lang="en-US" dirty="0"/>
+              <a:t>Week 4- Began updating documentation, created OneNote “engineering log”, work continued on individual components</a:t>
             </a:r>
           </a:p>
         </p:txBody>
@@ -31779,13 +31465,6 @@
   <p:clrMapOvr>
     <a:masterClrMapping/>
   </p:clrMapOvr>
-  <p:timing>
-    <p:tnLst>
-      <p:par>
-        <p:cTn id="1" dur="indefinite" restart="never" nodeType="tmRoot"/>
-      </p:par>
-    </p:tnLst>
-  </p:timing>
 </p:sld>
 </file>
 
@@ -31851,14 +31530,14 @@
           <a:lstStyle/>
           <a:p>
             <a:r>
-              <a:rPr lang="en-US"/>
-              <a:t>Week 5- Worked on the updating the tech and design doc. </a:t>
-            </a:r>
-          </a:p>
-          <a:p>
-            <a:r>
-              <a:rPr lang="en-US"/>
-              <a:t>Week 6- Totally reworked the project, rebuilding all the major parts, this allowed us to finally get all the parts to finally work together in conjunction.</a:t>
+              <a:rPr lang="en-US" dirty="0"/>
+              <a:t>Week 5- Began combining project components, continued to update Technology Review and Design Document</a:t>
+            </a:r>
+          </a:p>
+          <a:p>
+            <a:r>
+              <a:rPr lang="en-US" dirty="0"/>
+              <a:t>Week 6- Conducted major project rework, rewriting parser to read files line-by-line, switched to MVC design, updated data layer and UI to reflect new parser data</a:t>
             </a:r>
           </a:p>
         </p:txBody>
@@ -32313,13 +31992,6 @@
   <p:clrMapOvr>
     <a:masterClrMapping/>
   </p:clrMapOvr>
-  <p:timing>
-    <p:tnLst>
-      <p:par>
-        <p:cTn id="1" dur="indefinite" restart="never" nodeType="tmRoot"/>
-      </p:par>
-    </p:tnLst>
-  </p:timing>
 </p:sld>
 </file>
 
@@ -32451,13 +32123,6 @@
   <p:clrMapOvr>
     <a:masterClrMapping/>
   </p:clrMapOvr>
-  <p:timing>
-    <p:tnLst>
-      <p:par>
-        <p:cTn id="1" dur="indefinite" restart="never" nodeType="tmRoot"/>
-      </p:par>
-    </p:tnLst>
-  </p:timing>
 </p:sld>
 </file>
 
@@ -32552,13 +32217,6 @@
   <p:clrMapOvr>
     <a:masterClrMapping/>
   </p:clrMapOvr>
-  <p:timing>
-    <p:tnLst>
-      <p:par>
-        <p:cTn id="1" dur="indefinite" restart="never" nodeType="tmRoot"/>
-      </p:par>
-    </p:tnLst>
-  </p:timing>
 </p:sld>
 </file>
 
@@ -32653,13 +32311,6 @@
   <p:clrMapOvr>
     <a:masterClrMapping/>
   </p:clrMapOvr>
-  <p:timing>
-    <p:tnLst>
-      <p:par>
-        <p:cTn id="1" dur="indefinite" restart="never" nodeType="tmRoot"/>
-      </p:par>
-    </p:tnLst>
-  </p:timing>
 </p:sld>
 </file>
 
@@ -32731,13 +32382,6 @@
   <p:clrMapOvr>
     <a:masterClrMapping/>
   </p:clrMapOvr>
-  <p:timing>
-    <p:tnLst>
-      <p:par>
-        <p:cTn id="1" dur="indefinite" restart="never" nodeType="tmRoot"/>
-      </p:par>
-    </p:tnLst>
-  </p:timing>
 </p:sld>
 </file>
 
@@ -32790,13 +32434,6 @@
   <p:clrMapOvr>
     <a:masterClrMapping/>
   </p:clrMapOvr>
-  <p:timing>
-    <p:tnLst>
-      <p:par>
-        <p:cTn id="1" dur="indefinite" restart="never" nodeType="tmRoot"/>
-      </p:par>
-    </p:tnLst>
-  </p:timing>
 </p:sld>
 </file>
 
@@ -32833,10 +32470,9 @@
           <a:lstStyle/>
           <a:p>
             <a:r>
-              <a:rPr lang="en-US" dirty="0" smtClean="0"/>
+              <a:rPr lang="en-US" dirty="0"/>
               <a:t>Future Plans</a:t>
             </a:r>
-            <a:endParaRPr lang="en-US" dirty="0"/>
           </a:p>
         </p:txBody>
       </p:sp>
@@ -32858,69 +32494,68 @@
           <a:lstStyle/>
           <a:p>
             <a:r>
-              <a:rPr lang="en-US" smtClean="0"/>
+              <a:rPr lang="en-US"/>
               <a:t>Bug Fixes</a:t>
             </a:r>
           </a:p>
           <a:p>
             <a:r>
-              <a:rPr lang="en-US" dirty="0" smtClean="0"/>
+              <a:rPr lang="en-US" dirty="0"/>
               <a:t>Implement a Process Bridge</a:t>
             </a:r>
           </a:p>
           <a:p>
             <a:pPr lvl="1"/>
             <a:r>
-              <a:rPr lang="en-US" dirty="0" smtClean="0"/>
+              <a:rPr lang="en-US" dirty="0"/>
               <a:t>Send information between the UI and the extension logic</a:t>
             </a:r>
           </a:p>
           <a:p>
             <a:r>
-              <a:rPr lang="en-US" dirty="0" smtClean="0"/>
+              <a:rPr lang="en-US" dirty="0"/>
               <a:t>C-Like Function support for the parser</a:t>
             </a:r>
           </a:p>
           <a:p>
             <a:pPr lvl="1"/>
             <a:r>
-              <a:rPr lang="en-US" dirty="0" smtClean="0"/>
+              <a:rPr lang="en-US" dirty="0"/>
               <a:t>Change parser behavior</a:t>
             </a:r>
           </a:p>
           <a:p>
             <a:pPr lvl="1"/>
             <a:r>
-              <a:rPr lang="en-US" dirty="0" smtClean="0"/>
+              <a:rPr lang="en-US" dirty="0"/>
               <a:t>Build in default grammar support</a:t>
             </a:r>
           </a:p>
           <a:p>
             <a:r>
-              <a:rPr lang="en-US" dirty="0" smtClean="0"/>
+              <a:rPr lang="en-US" dirty="0"/>
               <a:t>Errors</a:t>
             </a:r>
           </a:p>
           <a:p>
             <a:pPr lvl="1"/>
             <a:r>
-              <a:rPr lang="en-US" dirty="0" smtClean="0"/>
+              <a:rPr lang="en-US" dirty="0"/>
               <a:t>Change parser behavior</a:t>
             </a:r>
           </a:p>
           <a:p>
             <a:pPr lvl="1"/>
             <a:r>
-              <a:rPr lang="en-US" dirty="0" smtClean="0"/>
+              <a:rPr lang="en-US" dirty="0"/>
               <a:t>Build in default grammar support</a:t>
             </a:r>
           </a:p>
           <a:p>
             <a:r>
-              <a:rPr lang="en-US" dirty="0" smtClean="0"/>
+              <a:rPr lang="en-US" dirty="0"/>
               <a:t>User Testing</a:t>
             </a:r>
-            <a:endParaRPr lang="en-US" dirty="0"/>
           </a:p>
         </p:txBody>
       </p:sp>
@@ -32934,13 +32569,6 @@
   <p:clrMapOvr>
     <a:masterClrMapping/>
   </p:clrMapOvr>
-  <p:timing>
-    <p:tnLst>
-      <p:par>
-        <p:cTn id="1" dur="indefinite" restart="never" nodeType="tmRoot"/>
-      </p:par>
-    </p:tnLst>
-  </p:timing>
 </p:sld>
 </file>
 
@@ -33033,13 +32661,6 @@
   <p:clrMapOvr>
     <a:masterClrMapping/>
   </p:clrMapOvr>
-  <p:timing>
-    <p:tnLst>
-      <p:par>
-        <p:cTn id="1" dur="indefinite" restart="never" nodeType="tmRoot"/>
-      </p:par>
-    </p:tnLst>
-  </p:timing>
 </p:sld>
 </file>
 
@@ -33354,10 +32975,9 @@
           <a:lstStyle/>
           <a:p>
             <a:r>
-              <a:rPr lang="en-US" smtClean="0"/>
+              <a:rPr lang="en-US"/>
               <a:t>Controller</a:t>
             </a:r>
-            <a:endParaRPr lang="en-US"/>
           </a:p>
         </p:txBody>
       </p:sp>
@@ -33625,13 +33245,6 @@
   <p:clrMapOvr>
     <a:masterClrMapping/>
   </p:clrMapOvr>
-  <p:timing>
-    <p:tnLst>
-      <p:par>
-        <p:cTn id="1" dur="indefinite" restart="never" nodeType="tmRoot"/>
-      </p:par>
-    </p:tnLst>
-  </p:timing>
 </p:sld>
 </file>
 
@@ -33713,11 +33326,7 @@
           <a:p>
             <a:r>
               <a:rPr lang="en-US"/>
-              <a:t>The Current </a:t>
-            </a:r>
-            <a:r>
-              <a:rPr lang="en-US" smtClean="0"/>
-              <a:t>Events:</a:t>
+              <a:t>The Current Events:</a:t>
             </a:r>
             <a:endParaRPr lang="en-US" dirty="0"/>
           </a:p>
@@ -33725,11 +33334,7 @@
             <a:pPr lvl="1"/>
             <a:r>
               <a:rPr lang="en-US"/>
-              <a:t>On extension </a:t>
-            </a:r>
-            <a:r>
-              <a:rPr lang="en-US" smtClean="0"/>
-              <a:t>activate</a:t>
+              <a:t>On extension activate</a:t>
             </a:r>
             <a:endParaRPr lang="en-US" dirty="0"/>
           </a:p>
@@ -33759,13 +33364,8 @@
             </a:r>
             <a:r>
               <a:rPr lang="en-US"/>
-              <a:t> error box in the </a:t>
-            </a:r>
-            <a:r>
-              <a:rPr lang="en-US" smtClean="0"/>
-              <a:t>GUI</a:t>
-            </a:r>
-            <a:endParaRPr lang="en-US"/>
+              <a:t> error box in the GUI</a:t>
+            </a:r>
           </a:p>
           <a:p>
             <a:pPr lvl="1"/>
@@ -33787,13 +33387,6 @@
   <p:clrMapOvr>
     <a:masterClrMapping/>
   </p:clrMapOvr>
-  <p:timing>
-    <p:tnLst>
-      <p:par>
-        <p:cTn id="1" dur="indefinite" restart="never" nodeType="tmRoot"/>
-      </p:par>
-    </p:tnLst>
-  </p:timing>
 </p:sld>
 </file>
 
@@ -33830,10 +33423,9 @@
           <a:lstStyle/>
           <a:p>
             <a:r>
-              <a:rPr lang="en-US" dirty="0" smtClean="0"/>
+              <a:rPr lang="en-US" dirty="0"/>
               <a:t>Controller</a:t>
             </a:r>
-            <a:endParaRPr lang="en-US" dirty="0"/>
           </a:p>
         </p:txBody>
       </p:sp>
@@ -33853,52 +33445,51 @@
           <a:lstStyle/>
           <a:p>
             <a:r>
-              <a:rPr lang="en-US" dirty="0" smtClean="0"/>
+              <a:rPr lang="en-US" dirty="0"/>
               <a:t>Manage subcomponents (Parser, UI, </a:t>
             </a:r>
             <a:r>
-              <a:rPr lang="en-US" dirty="0" err="1" smtClean="0"/>
+              <a:rPr lang="en-US" dirty="0" err="1"/>
               <a:t>etc</a:t>
             </a:r>
             <a:r>
-              <a:rPr lang="en-US" dirty="0" smtClean="0"/>
+              <a:rPr lang="en-US" dirty="0"/>
               <a:t>)</a:t>
             </a:r>
           </a:p>
           <a:p>
             <a:r>
-              <a:rPr lang="en-US" dirty="0" smtClean="0"/>
+              <a:rPr lang="en-US" dirty="0"/>
               <a:t>On Extension Activation:</a:t>
             </a:r>
           </a:p>
           <a:p>
             <a:pPr lvl="1"/>
             <a:r>
-              <a:rPr lang="en-US" dirty="0" smtClean="0"/>
+              <a:rPr lang="en-US" dirty="0"/>
               <a:t>Recursively retrieve a list of all Files and Directories in the User’s open project directory.</a:t>
             </a:r>
           </a:p>
           <a:p>
             <a:pPr lvl="1"/>
             <a:r>
-              <a:rPr lang="en-US" dirty="0" smtClean="0"/>
+              <a:rPr lang="en-US" dirty="0"/>
               <a:t>Call the parser for each file.</a:t>
             </a:r>
           </a:p>
           <a:p>
             <a:pPr lvl="1"/>
             <a:r>
-              <a:rPr lang="en-US" dirty="0" smtClean="0"/>
+              <a:rPr lang="en-US" dirty="0"/>
               <a:t>Serialize returned tokens into JSON File</a:t>
             </a:r>
           </a:p>
           <a:p>
             <a:pPr lvl="1"/>
             <a:r>
-              <a:rPr lang="en-US" dirty="0" smtClean="0"/>
+              <a:rPr lang="en-US" dirty="0"/>
               <a:t>Launch the UI</a:t>
             </a:r>
-            <a:endParaRPr lang="en-US" dirty="0"/>
           </a:p>
         </p:txBody>
       </p:sp>
@@ -33912,13 +33503,6 @@
   <p:clrMapOvr>
     <a:masterClrMapping/>
   </p:clrMapOvr>
-  <p:timing>
-    <p:tnLst>
-      <p:par>
-        <p:cTn id="1" dur="indefinite" restart="never" nodeType="tmRoot"/>
-      </p:par>
-    </p:tnLst>
-  </p:timing>
 </p:sld>
 </file>
 
@@ -33976,10 +33560,9 @@
           <a:p>
             <a:pPr algn="ctr"/>
             <a:r>
-              <a:rPr lang="en-US" dirty="0" smtClean="0"/>
+              <a:rPr lang="en-US" dirty="0"/>
               <a:t>VSC Code</a:t>
             </a:r>
-            <a:endParaRPr lang="en-US" dirty="0"/>
           </a:p>
         </p:txBody>
       </p:sp>
@@ -34020,10 +33603,9 @@
           <a:p>
             <a:pPr algn="ctr"/>
             <a:r>
-              <a:rPr lang="en-US" dirty="0" err="1" smtClean="0"/>
+              <a:rPr lang="en-US" dirty="0"/>
               <a:t>Extension.ts</a:t>
             </a:r>
-            <a:endParaRPr lang="en-US" dirty="0"/>
           </a:p>
         </p:txBody>
       </p:sp>
@@ -34103,10 +33685,9 @@
           <a:p>
             <a:pPr algn="ctr"/>
             <a:r>
-              <a:rPr lang="en-US" dirty="0" smtClean="0"/>
+              <a:rPr lang="en-US" dirty="0"/>
               <a:t>Controller</a:t>
             </a:r>
-            <a:endParaRPr lang="en-US" dirty="0"/>
           </a:p>
         </p:txBody>
       </p:sp>
@@ -34147,10 +33728,9 @@
           <a:p>
             <a:pPr algn="ctr"/>
             <a:r>
-              <a:rPr lang="en-US" dirty="0" smtClean="0"/>
+              <a:rPr lang="en-US" dirty="0"/>
               <a:t>Parser</a:t>
             </a:r>
-            <a:endParaRPr lang="en-US" dirty="0"/>
           </a:p>
         </p:txBody>
       </p:sp>
@@ -34196,10 +33776,9 @@
           <a:p>
             <a:pPr algn="ctr"/>
             <a:r>
-              <a:rPr lang="en-US" dirty="0" smtClean="0"/>
+              <a:rPr lang="en-US" dirty="0"/>
               <a:t>Get Files and Directories</a:t>
             </a:r>
-            <a:endParaRPr lang="en-US" dirty="0"/>
           </a:p>
         </p:txBody>
       </p:sp>
@@ -34245,10 +33824,9 @@
           <a:p>
             <a:pPr algn="ctr"/>
             <a:r>
-              <a:rPr lang="en-US" dirty="0" smtClean="0"/>
+              <a:rPr lang="en-US" dirty="0"/>
               <a:t>Parse Files, Get Tokens</a:t>
             </a:r>
-            <a:endParaRPr lang="en-US" dirty="0"/>
           </a:p>
         </p:txBody>
       </p:sp>
@@ -34294,10 +33872,9 @@
           <a:p>
             <a:pPr algn="ctr"/>
             <a:r>
-              <a:rPr lang="en-US" dirty="0" smtClean="0"/>
+              <a:rPr lang="en-US" dirty="0"/>
               <a:t>Process Tokens, serialize JSON</a:t>
             </a:r>
-            <a:endParaRPr lang="en-US" dirty="0"/>
           </a:p>
         </p:txBody>
       </p:sp>
@@ -34343,10 +33920,9 @@
           <a:p>
             <a:pPr algn="ctr"/>
             <a:r>
-              <a:rPr lang="en-US" dirty="0" smtClean="0"/>
+              <a:rPr lang="en-US" dirty="0"/>
               <a:t>Launch UI</a:t>
             </a:r>
-            <a:endParaRPr lang="en-US" dirty="0"/>
           </a:p>
         </p:txBody>
       </p:sp>
@@ -34430,10 +34006,9 @@
           <a:p>
             <a:pPr algn="ctr"/>
             <a:r>
-              <a:rPr lang="en-US" dirty="0" smtClean="0"/>
+              <a:rPr lang="en-US" dirty="0"/>
               <a:t>UI</a:t>
             </a:r>
-            <a:endParaRPr lang="en-US" dirty="0"/>
           </a:p>
         </p:txBody>
       </p:sp>
@@ -34595,18 +34170,13 @@
           <a:p>
             <a:pPr algn="ctr"/>
             <a:r>
-              <a:rPr lang="en-US" dirty="0" smtClean="0">
+              <a:rPr lang="en-US" dirty="0">
                 <a:solidFill>
                   <a:schemeClr val="tx1"/>
                 </a:solidFill>
               </a:rPr>
               <a:t>File </a:t>
             </a:r>
-            <a:endParaRPr lang="en-US" dirty="0">
-              <a:solidFill>
-                <a:schemeClr val="tx1"/>
-              </a:solidFill>
-            </a:endParaRPr>
           </a:p>
         </p:txBody>
       </p:sp>
@@ -34655,18 +34225,13 @@
           <a:p>
             <a:pPr algn="ctr"/>
             <a:r>
-              <a:rPr lang="en-US" dirty="0" smtClean="0">
+              <a:rPr lang="en-US" dirty="0">
                 <a:solidFill>
                   <a:schemeClr val="tx1"/>
                 </a:solidFill>
               </a:rPr>
               <a:t>Tokens </a:t>
             </a:r>
-            <a:endParaRPr lang="en-US" dirty="0">
-              <a:solidFill>
-                <a:schemeClr val="tx1"/>
-              </a:solidFill>
-            </a:endParaRPr>
           </a:p>
         </p:txBody>
       </p:sp>
@@ -34715,18 +34280,13 @@
           <a:p>
             <a:pPr algn="ctr"/>
             <a:r>
-              <a:rPr lang="en-US" dirty="0" smtClean="0">
+              <a:rPr lang="en-US" dirty="0">
                 <a:solidFill>
                   <a:schemeClr val="tx1"/>
                 </a:solidFill>
               </a:rPr>
               <a:t>Call Controller </a:t>
             </a:r>
-            <a:endParaRPr lang="en-US" dirty="0">
-              <a:solidFill>
-                <a:schemeClr val="tx1"/>
-              </a:solidFill>
-            </a:endParaRPr>
           </a:p>
         </p:txBody>
       </p:sp>
@@ -34775,18 +34335,13 @@
           <a:p>
             <a:pPr algn="ctr"/>
             <a:r>
-              <a:rPr lang="en-US" dirty="0" smtClean="0">
+              <a:rPr lang="en-US" dirty="0">
                 <a:solidFill>
                   <a:schemeClr val="tx1"/>
                 </a:solidFill>
               </a:rPr>
               <a:t>Postal command</a:t>
             </a:r>
-            <a:endParaRPr lang="en-US" dirty="0">
-              <a:solidFill>
-                <a:schemeClr val="tx1"/>
-              </a:solidFill>
-            </a:endParaRPr>
           </a:p>
         </p:txBody>
       </p:sp>
@@ -34835,18 +34390,13 @@
           <a:p>
             <a:pPr algn="ctr"/>
             <a:r>
-              <a:rPr lang="en-US" dirty="0" smtClean="0">
+              <a:rPr lang="en-US" dirty="0">
                 <a:solidFill>
                   <a:schemeClr val="tx1"/>
                 </a:solidFill>
               </a:rPr>
               <a:t>Call UI</a:t>
             </a:r>
-            <a:endParaRPr lang="en-US" dirty="0">
-              <a:solidFill>
-                <a:schemeClr val="tx1"/>
-              </a:solidFill>
-            </a:endParaRPr>
           </a:p>
         </p:txBody>
       </p:sp>
@@ -34860,13 +34410,6 @@
   <p:clrMapOvr>
     <a:masterClrMapping/>
   </p:clrMapOvr>
-  <p:timing>
-    <p:tnLst>
-      <p:par>
-        <p:cTn id="1" dur="indefinite" restart="never" nodeType="tmRoot"/>
-      </p:par>
-    </p:tnLst>
-  </p:timing>
 </p:sld>
 </file>
 

</xml_diff>